<commit_message>
eddited the powerpoint and change the diagram flow
</commit_message>
<xml_diff>
--- a/Power Point Presentation.pptx
+++ b/Power Point Presentation.pptx
@@ -5,15 +5,17 @@
     <p:sldMasterId id="2147483660" r:id="rId1"/>
   </p:sldMasterIdLst>
   <p:notesMasterIdLst>
-    <p:notesMasterId r:id="rId8"/>
+    <p:notesMasterId r:id="rId10"/>
   </p:notesMasterIdLst>
   <p:sldIdLst>
     <p:sldId id="256" r:id="rId2"/>
     <p:sldId id="257" r:id="rId3"/>
     <p:sldId id="258" r:id="rId4"/>
-    <p:sldId id="261" r:id="rId5"/>
+    <p:sldId id="262" r:id="rId5"/>
     <p:sldId id="259" r:id="rId6"/>
-    <p:sldId id="260" r:id="rId7"/>
+    <p:sldId id="263" r:id="rId7"/>
+    <p:sldId id="264" r:id="rId8"/>
+    <p:sldId id="261" r:id="rId9"/>
   </p:sldIdLst>
   <p:sldSz cx="9144000" cy="6858000" type="screen4x3"/>
   <p:notesSz cx="6858000" cy="9144000"/>
@@ -112,6 +114,22 @@
       </a:defRPr>
     </a:lvl9pPr>
   </p:defaultTextStyle>
+  <p:extLst>
+    <p:ext uri="{EFAFB233-063F-42B5-8137-9DF3F51BA10A}">
+      <p15:sldGuideLst xmlns:p15="http://schemas.microsoft.com/office/powerpoint/2012/main">
+        <p15:guide id="1" orient="horz" pos="2160">
+          <p15:clr>
+            <a:srgbClr val="A4A3A4"/>
+          </p15:clr>
+        </p15:guide>
+        <p15:guide id="2" pos="2880">
+          <p15:clr>
+            <a:srgbClr val="A4A3A4"/>
+          </p15:clr>
+        </p15:guide>
+      </p15:sldGuideLst>
+    </p:ext>
+  </p:extLst>
 </p:presentation>
 </file>
 
@@ -197,7 +215,7 @@
           <a:p>
             <a:fld id="{DE3F6151-9474-C843-8162-F934CDE5A86C}" type="datetimeFigureOut">
               <a:rPr lang="en-US" smtClean="0"/>
-              <a:t>2/16/16</a:t>
+              <a:t>2/20/2016</a:t>
             </a:fld>
             <a:endParaRPr lang="en-US"/>
           </a:p>
@@ -972,7 +990,7 @@
           <a:p>
             <a:fld id="{651A0C47-018D-4460-B945-BFF7981B6CA6}" type="datetimeFigureOut">
               <a:rPr lang="en-US" smtClean="0"/>
-              <a:t>2/16/16</a:t>
+              <a:t>2/20/2016</a:t>
             </a:fld>
             <a:endParaRPr lang="en-US"/>
           </a:p>
@@ -1304,7 +1322,7 @@
           <a:p>
             <a:fld id="{651A0C47-018D-4460-B945-BFF7981B6CA6}" type="datetimeFigureOut">
               <a:rPr lang="en-US" smtClean="0"/>
-              <a:t>2/16/16</a:t>
+              <a:t>2/20/2016</a:t>
             </a:fld>
             <a:endParaRPr lang="en-US"/>
           </a:p>
@@ -1636,7 +1654,7 @@
           <a:p>
             <a:fld id="{651A0C47-018D-4460-B945-BFF7981B6CA6}" type="datetimeFigureOut">
               <a:rPr lang="en-US" smtClean="0"/>
-              <a:t>2/16/16</a:t>
+              <a:t>2/20/2016</a:t>
             </a:fld>
             <a:endParaRPr lang="en-US"/>
           </a:p>
@@ -1968,7 +1986,7 @@
           <a:p>
             <a:fld id="{651A0C47-018D-4460-B945-BFF7981B6CA6}" type="datetimeFigureOut">
               <a:rPr lang="en-US" smtClean="0"/>
-              <a:t>2/16/16</a:t>
+              <a:t>2/20/2016</a:t>
             </a:fld>
             <a:endParaRPr lang="en-US"/>
           </a:p>
@@ -2657,7 +2675,7 @@
           <a:p>
             <a:fld id="{651A0C47-018D-4460-B945-BFF7981B6CA6}" type="datetimeFigureOut">
               <a:rPr lang="en-US" smtClean="0"/>
-              <a:t>2/16/16</a:t>
+              <a:t>2/20/2016</a:t>
             </a:fld>
             <a:endParaRPr lang="en-US"/>
           </a:p>
@@ -2836,7 +2854,7 @@
           <a:p>
             <a:fld id="{651A0C47-018D-4460-B945-BFF7981B6CA6}" type="datetimeFigureOut">
               <a:rPr lang="en-US" smtClean="0"/>
-              <a:t>2/16/16</a:t>
+              <a:t>2/20/2016</a:t>
             </a:fld>
             <a:endParaRPr lang="en-US"/>
           </a:p>
@@ -3010,7 +3028,7 @@
           <a:p>
             <a:fld id="{651A0C47-018D-4460-B945-BFF7981B6CA6}" type="datetimeFigureOut">
               <a:rPr lang="en-US" smtClean="0"/>
-              <a:t>2/16/16</a:t>
+              <a:t>2/20/2016</a:t>
             </a:fld>
             <a:endParaRPr lang="en-US"/>
           </a:p>
@@ -3258,7 +3276,7 @@
           <a:p>
             <a:fld id="{651A0C47-018D-4460-B945-BFF7981B6CA6}" type="datetimeFigureOut">
               <a:rPr lang="en-US" smtClean="0"/>
-              <a:t>2/16/16</a:t>
+              <a:t>2/20/2016</a:t>
             </a:fld>
             <a:endParaRPr lang="en-US"/>
           </a:p>
@@ -3588,7 +3606,7 @@
           <a:p>
             <a:fld id="{651A0C47-018D-4460-B945-BFF7981B6CA6}" type="datetimeFigureOut">
               <a:rPr lang="en-US" smtClean="0"/>
-              <a:t>2/16/16</a:t>
+              <a:t>2/20/2016</a:t>
             </a:fld>
             <a:endParaRPr lang="en-US"/>
           </a:p>
@@ -3880,7 +3898,7 @@
           <a:p>
             <a:fld id="{651A0C47-018D-4460-B945-BFF7981B6CA6}" type="datetimeFigureOut">
               <a:rPr lang="en-US" smtClean="0"/>
-              <a:t>2/16/16</a:t>
+              <a:t>2/20/2016</a:t>
             </a:fld>
             <a:endParaRPr lang="en-US"/>
           </a:p>
@@ -4316,7 +4334,7 @@
           <a:p>
             <a:fld id="{651A0C47-018D-4460-B945-BFF7981B6CA6}" type="datetimeFigureOut">
               <a:rPr lang="en-US" smtClean="0"/>
-              <a:t>2/16/16</a:t>
+              <a:t>2/20/2016</a:t>
             </a:fld>
             <a:endParaRPr lang="en-US"/>
           </a:p>
@@ -4503,7 +4521,7 @@
           <a:p>
             <a:fld id="{651A0C47-018D-4460-B945-BFF7981B6CA6}" type="datetimeFigureOut">
               <a:rPr lang="en-US" smtClean="0"/>
-              <a:t>2/16/16</a:t>
+              <a:t>2/20/2016</a:t>
             </a:fld>
             <a:endParaRPr lang="en-US"/>
           </a:p>
@@ -4593,7 +4611,7 @@
           <a:p>
             <a:fld id="{651A0C47-018D-4460-B945-BFF7981B6CA6}" type="datetimeFigureOut">
               <a:rPr lang="en-US" smtClean="0"/>
-              <a:t>2/16/16</a:t>
+              <a:t>2/20/2016</a:t>
             </a:fld>
             <a:endParaRPr lang="en-US"/>
           </a:p>
@@ -4874,7 +4892,7 @@
           <a:p>
             <a:fld id="{651A0C47-018D-4460-B945-BFF7981B6CA6}" type="datetimeFigureOut">
               <a:rPr lang="en-US" smtClean="0"/>
-              <a:t>2/16/16</a:t>
+              <a:t>2/20/2016</a:t>
             </a:fld>
             <a:endParaRPr lang="en-US"/>
           </a:p>
@@ -5089,7 +5107,7 @@
           <a:p>
             <a:fld id="{651A0C47-018D-4460-B945-BFF7981B6CA6}" type="datetimeFigureOut">
               <a:rPr lang="en-US" smtClean="0"/>
-              <a:t>2/16/16</a:t>
+              <a:t>2/20/2016</a:t>
             </a:fld>
             <a:endParaRPr lang="en-US"/>
           </a:p>
@@ -5690,34 +5708,34 @@
               <a:buNone/>
             </a:pPr>
             <a:r>
-              <a:rPr lang="en-US" smtClean="0">
+              <a:rPr lang="en-US" dirty="0" smtClean="0">
+                <a:effectLst/>
+              </a:rPr>
+              <a:t> Tic Tac Toe is a </a:t>
+            </a:r>
+            <a:r>
+              <a:rPr lang="en-US" dirty="0">
+                <a:effectLst/>
+              </a:rPr>
+              <a:t>game that is played with two players, X and O, who take turns marking spaces usually in a </a:t>
+            </a:r>
+            <a:r>
+              <a:rPr lang="en-US" dirty="0" smtClean="0">
+                <a:effectLst/>
+              </a:rPr>
+              <a:t>3X3</a:t>
+            </a:r>
+            <a:r>
+              <a:rPr lang="en-US" dirty="0" smtClean="0">
                 <a:effectLst/>
               </a:rPr>
               <a:t> </a:t>
             </a:r>
             <a:r>
-              <a:rPr lang="en-US" dirty="0" smtClean="0">
-                <a:effectLst/>
-              </a:rPr>
-              <a:t>Tic </a:t>
-            </a:r>
-            <a:r>
-              <a:rPr lang="en-US" dirty="0" err="1" smtClean="0">
-                <a:effectLst/>
-              </a:rPr>
-              <a:t>Tac</a:t>
-            </a:r>
-            <a:r>
-              <a:rPr lang="en-US" dirty="0" smtClean="0">
-                <a:effectLst/>
-              </a:rPr>
-              <a:t> Toe is a </a:t>
-            </a:r>
-            <a:r>
               <a:rPr lang="en-US" dirty="0">
                 <a:effectLst/>
               </a:rPr>
-              <a:t>game that is played with two players, X and O, who take turns marking spaces usually in a 5x5 grid</a:t>
+              <a:t>grid</a:t>
             </a:r>
             <a:r>
               <a:rPr lang="en-US" dirty="0" smtClean="0">
@@ -5734,7 +5752,13 @@
               <a:rPr lang="en-US" dirty="0" smtClean="0">
                 <a:effectLst/>
               </a:rPr>
-              <a:t>For this project the game will be change from its most common size 3x3 to a 6x6 introducing this way more challenge to players.</a:t>
+              <a:t>For this project the game will be change from its most common size 3x3 to a 6x6 </a:t>
+            </a:r>
+            <a:r>
+              <a:rPr lang="en-US" dirty="0" smtClean="0">
+                <a:effectLst/>
+              </a:rPr>
+              <a:t>with 4 squares require to win rather than 3.</a:t>
             </a:r>
             <a:endParaRPr lang="en-US" dirty="0">
               <a:effectLst/>
@@ -5749,6 +5773,18 @@
                 <a:effectLst/>
               </a:rPr>
               <a:t> </a:t>
+            </a:r>
+            <a:r>
+              <a:rPr lang="en-US" dirty="0">
+                <a:effectLst/>
+              </a:rPr>
+              <a:t>I</a:t>
+            </a:r>
+            <a:r>
+              <a:rPr lang="en-US" dirty="0" smtClean="0">
+                <a:effectLst/>
+              </a:rPr>
+              <a:t>n conclusion 6X6X4</a:t>
             </a:r>
             <a:endParaRPr lang="en-US" dirty="0"/>
           </a:p>
@@ -5800,8 +5836,16 @@
           <a:lstStyle/>
           <a:p>
             <a:r>
+              <a:rPr lang="en-US" b="1" dirty="0"/>
+              <a:t>P</a:t>
+            </a:r>
+            <a:r>
               <a:rPr lang="en-US" b="1" dirty="0" smtClean="0"/>
-              <a:t>Functional Requirements </a:t>
+              <a:t>urpose</a:t>
+            </a:r>
+            <a:r>
+              <a:rPr lang="en-US" b="1" dirty="0" smtClean="0"/>
+              <a:t> of the Game</a:t>
             </a:r>
             <a:endParaRPr lang="en-US" b="1" dirty="0"/>
           </a:p>
@@ -5824,78 +5868,75 @@
           </a:bodyPr>
           <a:lstStyle/>
           <a:p>
+            <a:pPr>
+              <a:buFont typeface="Arial" panose="020B0604020202020204" pitchFamily="34" charset="0"/>
+              <a:buChar char="•"/>
+            </a:pPr>
             <a:r>
               <a:rPr lang="en-US" dirty="0" smtClean="0"/>
-              <a:t>Use Case 1:</a:t>
-            </a:r>
-          </a:p>
-          <a:p>
-            <a:pPr lvl="5">
-              <a:buFont typeface="Wingdings" charset="2"/>
-              <a:buChar char="u"/>
+              <a:t>The purpose of the game is to win against a player or an Artificial intelligence.</a:t>
+            </a:r>
+          </a:p>
+          <a:p>
+            <a:pPr>
+              <a:buFont typeface="Arial" panose="020B0604020202020204" pitchFamily="34" charset="0"/>
+              <a:buChar char="•"/>
             </a:pPr>
             <a:r>
               <a:rPr lang="en-US" dirty="0" smtClean="0"/>
-              <a:t>Goals of actor: To play the game during downtime, to be entertained and to win the game. </a:t>
-            </a:r>
-          </a:p>
-          <a:p>
-            <a:pPr lvl="5">
-              <a:buFont typeface="Wingdings" charset="2"/>
-              <a:buChar char="u"/>
+              <a:t>To win, the player with most 4 square lined up wins:</a:t>
+            </a:r>
+          </a:p>
+          <a:p>
+            <a:pPr lvl="1">
+              <a:buFont typeface="Arial" panose="020B0604020202020204" pitchFamily="34" charset="0"/>
+              <a:buChar char="•"/>
             </a:pPr>
-            <a:endParaRPr lang="en-US" dirty="0"/>
-          </a:p>
-          <a:p>
-            <a:pPr lvl="5">
-              <a:buFont typeface="Wingdings" charset="2"/>
-              <a:buChar char="u"/>
+            <a:r>
+              <a:rPr lang="en-US" dirty="0" smtClean="0"/>
+              <a:t>Vertically</a:t>
+            </a:r>
+          </a:p>
+          <a:p>
+            <a:pPr lvl="1">
+              <a:buFont typeface="Arial" panose="020B0604020202020204" pitchFamily="34" charset="0"/>
+              <a:buChar char="•"/>
             </a:pPr>
             <a:r>
-              <a:rPr lang="en-US" dirty="0"/>
-              <a:t>Task: The game user starts a game. The system should create a game for the player so he/she can choose an opponent or play against the PC also allowing the user to pick the difficulty level and start a new game. </a:t>
-            </a:r>
-          </a:p>
-          <a:p>
-            <a:pPr lvl="5">
-              <a:buFont typeface="Wingdings" charset="2"/>
-              <a:buChar char="u"/>
+              <a:rPr lang="en-US" dirty="0" smtClean="0"/>
+              <a:t>Horizontally</a:t>
+            </a:r>
+          </a:p>
+          <a:p>
+            <a:pPr lvl="1">
+              <a:buFont typeface="Arial" panose="020B0604020202020204" pitchFamily="34" charset="0"/>
+              <a:buChar char="•"/>
             </a:pPr>
-            <a:endParaRPr lang="en-US" dirty="0"/>
-          </a:p>
-          <a:p>
-            <a:pPr lvl="5">
-              <a:buFont typeface="Wingdings" charset="2"/>
-              <a:buChar char="u"/>
+            <a:r>
+              <a:rPr lang="en-US" dirty="0" smtClean="0"/>
+              <a:t>diagonal.</a:t>
+            </a:r>
+          </a:p>
+          <a:p>
+            <a:pPr>
+              <a:buFont typeface="Arial" panose="020B0604020202020204" pitchFamily="34" charset="0"/>
+              <a:buChar char="•"/>
             </a:pPr>
             <a:r>
-              <a:rPr lang="en-US" dirty="0"/>
-              <a:t>Preconditions :Clean game </a:t>
-            </a:r>
-          </a:p>
-          <a:p>
-            <a:pPr lvl="5">
-              <a:buFont typeface="Wingdings" charset="2"/>
-              <a:buChar char="u"/>
+              <a:rPr lang="en-US" dirty="0" smtClean="0"/>
+              <a:t>Winner will be determine after the board is filled up.</a:t>
+            </a:r>
+          </a:p>
+          <a:p>
+            <a:pPr>
+              <a:buFont typeface="Arial" panose="020B0604020202020204" pitchFamily="34" charset="0"/>
+              <a:buChar char="•"/>
             </a:pPr>
-            <a:endParaRPr lang="en-US" dirty="0"/>
-          </a:p>
-          <a:p>
-            <a:pPr lvl="5">
-              <a:buFont typeface="Wingdings" charset="2"/>
-              <a:buChar char="u"/>
-            </a:pPr>
-            <a:r>
-              <a:rPr lang="en-US" dirty="0"/>
-              <a:t>Exceptions: If a game is already in process, the application will show an error message</a:t>
-            </a:r>
-            <a:r>
-              <a:rPr lang="en-US" dirty="0">
-                <a:effectLst/>
-              </a:rPr>
-              <a:t>. </a:t>
-            </a:r>
-            <a:endParaRPr lang="en-US" dirty="0"/>
+            <a:r>
+              <a:rPr lang="en-US" dirty="0" smtClean="0"/>
+              <a:t>Have fun playing </a:t>
+            </a:r>
+            <a:endParaRPr lang="en-US" dirty="0" smtClean="0"/>
           </a:p>
         </p:txBody>
       </p:sp>
@@ -5946,46 +5987,74 @@
           <a:p>
             <a:r>
               <a:rPr lang="en-US" dirty="0" smtClean="0"/>
-              <a:t>UML Diagram</a:t>
+              <a:t>How the game will work</a:t>
             </a:r>
             <a:endParaRPr lang="en-US" dirty="0"/>
           </a:p>
         </p:txBody>
       </p:sp>
-      <p:pic>
-        <p:nvPicPr>
-          <p:cNvPr id="6" name="Picture 5" descr="Screen Shot 2016-02-16 at 12.43.06 PM.png"/>
-          <p:cNvPicPr>
-            <a:picLocks noChangeAspect="1"/>
-          </p:cNvPicPr>
-          <p:nvPr/>
-        </p:nvPicPr>
-        <p:blipFill>
-          <a:blip r:embed="rId2">
-            <a:extLst>
-              <a:ext uri="{28A0092B-C50C-407E-A947-70E740481C1C}">
-                <a14:useLocalDpi xmlns:a14="http://schemas.microsoft.com/office/drawing/2010/main" val="0"/>
-              </a:ext>
-            </a:extLst>
-          </a:blip>
-          <a:stretch>
-            <a:fillRect/>
-          </a:stretch>
-        </p:blipFill>
-        <p:spPr>
-          <a:xfrm>
-            <a:off x="658160" y="1269430"/>
-            <a:ext cx="7823200" cy="5422900"/>
-          </a:xfrm>
-          <a:prstGeom prst="rect">
-            <a:avLst/>
-          </a:prstGeom>
-        </p:spPr>
-      </p:pic>
+      <p:sp>
+        <p:nvSpPr>
+          <p:cNvPr id="3" name="Content Placeholder 2"/>
+          <p:cNvSpPr>
+            <a:spLocks noGrp="1"/>
+          </p:cNvSpPr>
+          <p:nvPr>
+            <p:ph idx="1"/>
+          </p:nvPr>
+        </p:nvSpPr>
+        <p:spPr/>
+        <p:txBody>
+          <a:bodyPr>
+            <a:normAutofit/>
+          </a:bodyPr>
+          <a:lstStyle/>
+          <a:p>
+            <a:pPr>
+              <a:buFont typeface="Arial" panose="020B0604020202020204" pitchFamily="34" charset="0"/>
+              <a:buChar char="•"/>
+            </a:pPr>
+            <a:r>
+              <a:rPr lang="en-US" sz="2800" dirty="0" smtClean="0"/>
+              <a:t>At the start of the game, you will be given a menu</a:t>
+            </a:r>
+          </a:p>
+          <a:p>
+            <a:pPr>
+              <a:buFont typeface="Arial" panose="020B0604020202020204" pitchFamily="34" charset="0"/>
+              <a:buChar char="•"/>
+            </a:pPr>
+            <a:r>
+              <a:rPr lang="en-US" sz="2800" dirty="0" smtClean="0"/>
+              <a:t>This menu will show you a log on screen</a:t>
+            </a:r>
+          </a:p>
+          <a:p>
+            <a:pPr>
+              <a:buFont typeface="Arial" panose="020B0604020202020204" pitchFamily="34" charset="0"/>
+              <a:buChar char="•"/>
+            </a:pPr>
+            <a:r>
+              <a:rPr lang="en-US" sz="2800" dirty="0" smtClean="0"/>
+              <a:t>User can sign in or pick to sign up.</a:t>
+            </a:r>
+          </a:p>
+          <a:p>
+            <a:pPr>
+              <a:buFont typeface="Arial" panose="020B0604020202020204" pitchFamily="34" charset="0"/>
+              <a:buChar char="•"/>
+            </a:pPr>
+            <a:r>
+              <a:rPr lang="en-US" sz="2800" dirty="0" smtClean="0"/>
+              <a:t>Once you have your username or already have one, the game will begin</a:t>
+            </a:r>
+          </a:p>
+        </p:txBody>
+      </p:sp>
     </p:spTree>
     <p:extLst>
       <p:ext uri="{BB962C8B-B14F-4D97-AF65-F5344CB8AC3E}">
-        <p14:creationId xmlns:p14="http://schemas.microsoft.com/office/powerpoint/2010/main" val="2332235830"/>
+        <p14:creationId xmlns:p14="http://schemas.microsoft.com/office/powerpoint/2010/main" val="2756794423"/>
       </p:ext>
     </p:extLst>
   </p:cSld>
@@ -6029,7 +6098,7 @@
           <a:p>
             <a:r>
               <a:rPr lang="en-US" dirty="0" smtClean="0"/>
-              <a:t>Functional Requirements </a:t>
+              <a:t>User Requirement</a:t>
             </a:r>
             <a:endParaRPr lang="en-US" dirty="0"/>
           </a:p>
@@ -6054,8 +6123,13 @@
           <a:p>
             <a:r>
               <a:rPr lang="en-US" dirty="0" smtClean="0"/>
-              <a:t>Use Case 1:</a:t>
-            </a:r>
+              <a:t>user requirement</a:t>
+            </a:r>
+            <a:r>
+              <a:rPr lang="en-US" dirty="0" smtClean="0"/>
+              <a:t>:</a:t>
+            </a:r>
+            <a:endParaRPr lang="en-US" dirty="0" smtClean="0"/>
           </a:p>
           <a:p>
             <a:pPr lvl="5">
@@ -6063,16 +6137,17 @@
               <a:buChar char="u"/>
             </a:pPr>
             <a:r>
-              <a:rPr lang="en-US" dirty="0"/>
-              <a:t>Goals of actor: Register the user name . </a:t>
-            </a:r>
+              <a:rPr lang="en-US" sz="2800" dirty="0" smtClean="0"/>
+              <a:t>Login in as a user in order to play</a:t>
+            </a:r>
+            <a:endParaRPr lang="en-US" sz="2800" dirty="0" smtClean="0"/>
           </a:p>
           <a:p>
             <a:pPr lvl="5">
               <a:buFont typeface="Wingdings" charset="2"/>
               <a:buChar char="u"/>
             </a:pPr>
-            <a:endParaRPr lang="en-US" dirty="0"/>
+            <a:endParaRPr lang="en-US" sz="2800" dirty="0"/>
           </a:p>
           <a:p>
             <a:pPr lvl="5">
@@ -6080,43 +6155,26 @@
               <a:buChar char="u"/>
             </a:pPr>
             <a:r>
-              <a:rPr lang="en-US" dirty="0"/>
-              <a:t>Task: Register user name to log into the game and be able to play. </a:t>
-            </a:r>
+              <a:rPr lang="en-US" sz="2800" dirty="0" smtClean="0"/>
+              <a:t>Game starts as a player vs another Player</a:t>
+            </a:r>
+          </a:p>
+          <a:p>
+            <a:pPr marL="1719263" lvl="5" indent="0">
+              <a:buNone/>
+            </a:pPr>
+            <a:endParaRPr lang="en-US" sz="2800" dirty="0" smtClean="0"/>
           </a:p>
           <a:p>
             <a:pPr lvl="5">
               <a:buFont typeface="Wingdings" charset="2"/>
               <a:buChar char="u"/>
             </a:pPr>
-            <a:endParaRPr lang="en-US" dirty="0"/>
-          </a:p>
-          <a:p>
-            <a:pPr lvl="5">
-              <a:buFont typeface="Wingdings" charset="2"/>
-              <a:buChar char="u"/>
-            </a:pPr>
-            <a:r>
-              <a:rPr lang="en-US" dirty="0"/>
-              <a:t>Preconditions :No registered user name </a:t>
-            </a:r>
-          </a:p>
-          <a:p>
-            <a:pPr lvl="5">
-              <a:buFont typeface="Wingdings" charset="2"/>
-              <a:buChar char="u"/>
-            </a:pPr>
-            <a:endParaRPr lang="en-US" dirty="0"/>
-          </a:p>
-          <a:p>
-            <a:pPr lvl="5">
-              <a:buFont typeface="Wingdings" charset="2"/>
-              <a:buChar char="u"/>
-            </a:pPr>
-            <a:r>
-              <a:rPr lang="en-US" dirty="0"/>
-              <a:t>Exceptions: Display error message if user name is already taken. </a:t>
-            </a:r>
+            <a:r>
+              <a:rPr lang="en-US" sz="2800" dirty="0" smtClean="0"/>
+              <a:t>Update score as users have aligned squares</a:t>
+            </a:r>
+            <a:endParaRPr lang="en-US" sz="2800" dirty="0" smtClean="0"/>
           </a:p>
         </p:txBody>
       </p:sp>
@@ -6162,16 +6220,14 @@
         </p:nvSpPr>
         <p:spPr/>
         <p:txBody>
-          <a:bodyPr>
-            <a:normAutofit fontScale="90000"/>
-          </a:bodyPr>
+          <a:bodyPr/>
           <a:lstStyle/>
           <a:p>
             <a:r>
-              <a:rPr lang="en-US" b="1" dirty="0" smtClean="0"/>
-              <a:t>Non-Functional Requirements </a:t>
-            </a:r>
-            <a:endParaRPr lang="en-US" b="1" dirty="0"/>
+              <a:rPr lang="en-US" dirty="0" smtClean="0"/>
+              <a:t>New User Requirement</a:t>
+            </a:r>
+            <a:endParaRPr lang="en-US" dirty="0"/>
           </a:p>
         </p:txBody>
       </p:sp>
@@ -6185,93 +6241,74 @@
             <p:ph idx="1"/>
           </p:nvPr>
         </p:nvSpPr>
-        <p:spPr>
-          <a:xfrm>
-            <a:off x="685800" y="1339157"/>
-            <a:ext cx="7770813" cy="4787006"/>
-          </a:xfrm>
-        </p:spPr>
-        <p:txBody>
-          <a:bodyPr>
-            <a:normAutofit fontScale="85000" lnSpcReduction="20000"/>
-          </a:bodyPr>
+        <p:spPr/>
+        <p:txBody>
+          <a:bodyPr/>
           <a:lstStyle/>
           <a:p>
-            <a:pPr marL="0" indent="0">
-              <a:buNone/>
+            <a:r>
+              <a:rPr lang="en-US" dirty="0" smtClean="0"/>
+              <a:t>New User Requirement</a:t>
+            </a:r>
+            <a:r>
+              <a:rPr lang="en-US" dirty="0"/>
+              <a:t>:</a:t>
+            </a:r>
+          </a:p>
+          <a:p>
+            <a:pPr lvl="5">
+              <a:buFont typeface="Wingdings" charset="2"/>
+              <a:buChar char="u"/>
             </a:pPr>
             <a:r>
-              <a:rPr lang="en-US" sz="2400" b="1" dirty="0" smtClean="0"/>
-              <a:t>Cost constraints</a:t>
-            </a:r>
-          </a:p>
-          <a:p>
-            <a:pPr marL="0" indent="0">
-              <a:buNone/>
+              <a:rPr lang="en-US" sz="2800" dirty="0"/>
+              <a:t>Register the user in order to login</a:t>
+            </a:r>
+          </a:p>
+          <a:p>
+            <a:pPr lvl="5">
+              <a:buFont typeface="Wingdings" charset="2"/>
+              <a:buChar char="u"/>
             </a:pPr>
-            <a:r>
-              <a:rPr lang="en-US" sz="2400" dirty="0"/>
-              <a:t>No cost constraints are foreseeable in the near future.</a:t>
-            </a:r>
-          </a:p>
-          <a:p>
-            <a:pPr marL="0" indent="0">
-              <a:buNone/>
+            <a:endParaRPr lang="en-US" sz="2800" dirty="0"/>
+          </a:p>
+          <a:p>
+            <a:pPr lvl="5">
+              <a:buFont typeface="Wingdings" charset="2"/>
+              <a:buChar char="u"/>
             </a:pPr>
             <a:r>
-              <a:rPr lang="en-US" sz="2400" dirty="0"/>
-              <a:t>The project has a budget of $48,000.00 the monthly maintenance cost should not exceed $280.00 a month.</a:t>
-            </a:r>
-          </a:p>
-          <a:p>
-            <a:pPr marL="0" indent="0">
+              <a:rPr lang="en-US" sz="2800" dirty="0" smtClean="0"/>
+              <a:t> Game starts as </a:t>
+            </a:r>
+            <a:r>
+              <a:rPr lang="en-US" sz="2800" dirty="0"/>
+              <a:t>player </a:t>
+            </a:r>
+            <a:r>
+              <a:rPr lang="en-US" sz="2800" dirty="0" smtClean="0"/>
+              <a:t>vs </a:t>
+            </a:r>
+            <a:r>
+              <a:rPr lang="en-US" sz="2800" dirty="0"/>
+              <a:t>Player</a:t>
+            </a:r>
+          </a:p>
+          <a:p>
+            <a:pPr marL="1719263" lvl="5" indent="0">
               <a:buNone/>
             </a:pPr>
-            <a:r>
-              <a:rPr lang="en-US" sz="2400" b="1" dirty="0"/>
-              <a:t> Reliability </a:t>
-            </a:r>
-          </a:p>
-          <a:p>
-            <a:pPr marL="0" indent="0">
-              <a:buNone/>
+            <a:endParaRPr lang="en-US" sz="2800" dirty="0"/>
+          </a:p>
+          <a:p>
+            <a:pPr lvl="5">
+              <a:buFont typeface="Wingdings" charset="2"/>
+              <a:buChar char="u"/>
             </a:pPr>
             <a:r>
-              <a:rPr lang="en-US" sz="2400" dirty="0"/>
-              <a:t>The software should be usable, without any operational faults, for the period of time between its deployment and the following three years.</a:t>
-            </a:r>
-          </a:p>
-          <a:p>
-            <a:pPr marL="0" indent="0">
-              <a:buNone/>
-            </a:pPr>
-            <a:r>
-              <a:rPr lang="en-US" sz="2400" b="1" dirty="0"/>
-              <a:t>Time Constraints </a:t>
-            </a:r>
-          </a:p>
-          <a:p>
-            <a:pPr marL="0" indent="0">
-              <a:buNone/>
-            </a:pPr>
-            <a:r>
-              <a:rPr lang="en-US" sz="2400" dirty="0"/>
-              <a:t>Most meetings took place either after CS 3420 class and/or in Google Hangouts, Skype calls, and email in order to accommodate all group members with good schedules where we could all meet without running into any time constraints whilst building the application and filling out the required documents for the project </a:t>
-            </a:r>
-          </a:p>
-          <a:p>
-            <a:pPr marL="0" indent="0">
-              <a:buNone/>
-            </a:pPr>
-            <a:endParaRPr lang="en-US" dirty="0">
-              <a:effectLst/>
-            </a:endParaRPr>
-          </a:p>
-          <a:p>
-            <a:pPr marL="0" indent="0">
-              <a:buNone/>
-            </a:pPr>
-            <a:endParaRPr lang="en-US" dirty="0" smtClean="0"/>
+              <a:rPr lang="en-US" sz="2800" dirty="0"/>
+              <a:t>Update score as users have aligned squares</a:t>
+            </a:r>
           </a:p>
           <a:p>
             <a:endParaRPr lang="en-US" dirty="0"/>
@@ -6281,7 +6318,225 @@
     </p:spTree>
     <p:extLst>
       <p:ext uri="{BB962C8B-B14F-4D97-AF65-F5344CB8AC3E}">
-        <p14:creationId xmlns:p14="http://schemas.microsoft.com/office/powerpoint/2010/main" val="3132705479"/>
+        <p14:creationId xmlns:p14="http://schemas.microsoft.com/office/powerpoint/2010/main" val="1250212995"/>
+      </p:ext>
+    </p:extLst>
+  </p:cSld>
+  <p:clrMapOvr>
+    <a:masterClrMapping/>
+  </p:clrMapOvr>
+</p:sld>
+</file>
+
+<file path=ppt/slides/slide7.xml><?xml version="1.0" encoding="utf-8"?>
+<p:sld xmlns:a="http://schemas.openxmlformats.org/drawingml/2006/main" xmlns:r="http://schemas.openxmlformats.org/officeDocument/2006/relationships" xmlns:p="http://schemas.openxmlformats.org/presentationml/2006/main">
+  <p:cSld>
+    <p:spTree>
+      <p:nvGrpSpPr>
+        <p:cNvPr id="1" name=""/>
+        <p:cNvGrpSpPr/>
+        <p:nvPr/>
+      </p:nvGrpSpPr>
+      <p:grpSpPr>
+        <a:xfrm>
+          <a:off x="0" y="0"/>
+          <a:ext cx="0" cy="0"/>
+          <a:chOff x="0" y="0"/>
+          <a:chExt cx="0" cy="0"/>
+        </a:xfrm>
+      </p:grpSpPr>
+      <p:sp>
+        <p:nvSpPr>
+          <p:cNvPr id="2" name="Title 1"/>
+          <p:cNvSpPr>
+            <a:spLocks noGrp="1"/>
+          </p:cNvSpPr>
+          <p:nvPr>
+            <p:ph type="title"/>
+          </p:nvPr>
+        </p:nvSpPr>
+        <p:spPr/>
+        <p:txBody>
+          <a:bodyPr/>
+          <a:lstStyle/>
+          <a:p>
+            <a:r>
+              <a:rPr lang="en-US" dirty="0" smtClean="0"/>
+              <a:t>Special case of Player vs AI</a:t>
+            </a:r>
+            <a:endParaRPr lang="en-US" dirty="0"/>
+          </a:p>
+        </p:txBody>
+      </p:sp>
+      <p:sp>
+        <p:nvSpPr>
+          <p:cNvPr id="3" name="Content Placeholder 2"/>
+          <p:cNvSpPr>
+            <a:spLocks noGrp="1"/>
+          </p:cNvSpPr>
+          <p:nvPr>
+            <p:ph idx="1"/>
+          </p:nvPr>
+        </p:nvSpPr>
+        <p:spPr/>
+        <p:txBody>
+          <a:bodyPr/>
+          <a:lstStyle/>
+          <a:p>
+            <a:r>
+              <a:rPr lang="en-US" dirty="0" smtClean="0"/>
+              <a:t>Player and AI:</a:t>
+            </a:r>
+            <a:endParaRPr lang="en-US" dirty="0"/>
+          </a:p>
+          <a:p>
+            <a:pPr lvl="5">
+              <a:buFont typeface="Wingdings" charset="2"/>
+              <a:buChar char="u"/>
+            </a:pPr>
+            <a:r>
+              <a:rPr lang="en-US" sz="2800" dirty="0" smtClean="0"/>
+              <a:t>Login as a user and Choose vs AI</a:t>
+            </a:r>
+            <a:endParaRPr lang="en-US" sz="2800" dirty="0"/>
+          </a:p>
+          <a:p>
+            <a:pPr lvl="5">
+              <a:buFont typeface="Wingdings" charset="2"/>
+              <a:buChar char="u"/>
+            </a:pPr>
+            <a:endParaRPr lang="en-US" sz="2800" dirty="0"/>
+          </a:p>
+          <a:p>
+            <a:pPr lvl="5">
+              <a:buFont typeface="Wingdings" charset="2"/>
+              <a:buChar char="u"/>
+            </a:pPr>
+            <a:r>
+              <a:rPr lang="en-US" sz="2800" dirty="0"/>
+              <a:t> Game starts as player vs </a:t>
+            </a:r>
+            <a:r>
+              <a:rPr lang="en-US" sz="2800" dirty="0" smtClean="0"/>
+              <a:t>AI</a:t>
+            </a:r>
+            <a:endParaRPr lang="en-US" sz="2800" dirty="0"/>
+          </a:p>
+          <a:p>
+            <a:pPr marL="1719263" lvl="5" indent="0">
+              <a:buNone/>
+            </a:pPr>
+            <a:endParaRPr lang="en-US" sz="2800" dirty="0"/>
+          </a:p>
+          <a:p>
+            <a:pPr lvl="5">
+              <a:buFont typeface="Wingdings" charset="2"/>
+              <a:buChar char="u"/>
+            </a:pPr>
+            <a:r>
+              <a:rPr lang="en-US" sz="2800" dirty="0"/>
+              <a:t>Update score as </a:t>
+            </a:r>
+            <a:r>
+              <a:rPr lang="en-US" sz="2800" dirty="0" smtClean="0"/>
+              <a:t>player </a:t>
+            </a:r>
+            <a:r>
+              <a:rPr lang="en-US" sz="2800" dirty="0"/>
+              <a:t>have aligned squares</a:t>
+            </a:r>
+          </a:p>
+          <a:p>
+            <a:endParaRPr lang="en-US" dirty="0"/>
+          </a:p>
+        </p:txBody>
+      </p:sp>
+    </p:spTree>
+    <p:extLst>
+      <p:ext uri="{BB962C8B-B14F-4D97-AF65-F5344CB8AC3E}">
+        <p14:creationId xmlns:p14="http://schemas.microsoft.com/office/powerpoint/2010/main" val="1106006034"/>
+      </p:ext>
+    </p:extLst>
+  </p:cSld>
+  <p:clrMapOvr>
+    <a:masterClrMapping/>
+  </p:clrMapOvr>
+</p:sld>
+</file>
+
+<file path=ppt/slides/slide8.xml><?xml version="1.0" encoding="utf-8"?>
+<p:sld xmlns:a="http://schemas.openxmlformats.org/drawingml/2006/main" xmlns:r="http://schemas.openxmlformats.org/officeDocument/2006/relationships" xmlns:p="http://schemas.openxmlformats.org/presentationml/2006/main">
+  <p:cSld>
+    <p:spTree>
+      <p:nvGrpSpPr>
+        <p:cNvPr id="1" name=""/>
+        <p:cNvGrpSpPr/>
+        <p:nvPr/>
+      </p:nvGrpSpPr>
+      <p:grpSpPr>
+        <a:xfrm>
+          <a:off x="0" y="0"/>
+          <a:ext cx="0" cy="0"/>
+          <a:chOff x="0" y="0"/>
+          <a:chExt cx="0" cy="0"/>
+        </a:xfrm>
+      </p:grpSpPr>
+      <p:sp>
+        <p:nvSpPr>
+          <p:cNvPr id="2" name="Title 1"/>
+          <p:cNvSpPr>
+            <a:spLocks noGrp="1"/>
+          </p:cNvSpPr>
+          <p:nvPr>
+            <p:ph type="title"/>
+          </p:nvPr>
+        </p:nvSpPr>
+        <p:spPr/>
+        <p:txBody>
+          <a:bodyPr/>
+          <a:lstStyle/>
+          <a:p>
+            <a:r>
+              <a:rPr lang="en-US" dirty="0" smtClean="0"/>
+              <a:t>Game flow diagram</a:t>
+            </a:r>
+            <a:endParaRPr lang="en-US" dirty="0"/>
+          </a:p>
+        </p:txBody>
+      </p:sp>
+      <p:pic>
+        <p:nvPicPr>
+          <p:cNvPr id="4" name="Content Placeholder 3"/>
+          <p:cNvPicPr>
+            <a:picLocks noGrp="1" noChangeAspect="1"/>
+          </p:cNvPicPr>
+          <p:nvPr>
+            <p:ph idx="1"/>
+          </p:nvPr>
+        </p:nvPicPr>
+        <p:blipFill>
+          <a:blip r:embed="rId2" cstate="email">
+            <a:extLst>
+              <a:ext uri="{28A0092B-C50C-407E-A947-70E740481C1C}">
+                <a14:useLocalDpi xmlns:a14="http://schemas.microsoft.com/office/drawing/2010/main" val="0"/>
+              </a:ext>
+            </a:extLst>
+          </a:blip>
+          <a:stretch>
+            <a:fillRect/>
+          </a:stretch>
+        </p:blipFill>
+        <p:spPr>
+          <a:xfrm>
+            <a:off x="1655064" y="1389888"/>
+            <a:ext cx="5422391" cy="5065776"/>
+          </a:xfrm>
+        </p:spPr>
+      </p:pic>
+    </p:spTree>
+    <p:extLst>
+      <p:ext uri="{BB962C8B-B14F-4D97-AF65-F5344CB8AC3E}">
+        <p14:creationId xmlns:p14="http://schemas.microsoft.com/office/powerpoint/2010/main" val="2332235830"/>
       </p:ext>
     </p:extLst>
   </p:cSld>

</xml_diff>

<commit_message>
updated the software engineering files such as requirement, manageman plan
</commit_message>
<xml_diff>
--- a/Power Point Presentation.pptx
+++ b/Power Point Presentation.pptx
@@ -5723,13 +5723,7 @@
               <a:rPr lang="en-US" dirty="0" smtClean="0">
                 <a:effectLst/>
               </a:rPr>
-              <a:t>3X3</a:t>
-            </a:r>
-            <a:r>
-              <a:rPr lang="en-US" dirty="0" smtClean="0">
-                <a:effectLst/>
-              </a:rPr>
-              <a:t> </a:t>
+              <a:t>3X3 </a:t>
             </a:r>
             <a:r>
               <a:rPr lang="en-US" dirty="0">
@@ -5752,13 +5746,7 @@
               <a:rPr lang="en-US" dirty="0" smtClean="0">
                 <a:effectLst/>
               </a:rPr>
-              <a:t>For this project the game will be change from its most common size 3x3 to a 6x6 </a:t>
-            </a:r>
-            <a:r>
-              <a:rPr lang="en-US" dirty="0" smtClean="0">
-                <a:effectLst/>
-              </a:rPr>
-              <a:t>with 4 squares require to win rather than 3.</a:t>
+              <a:t>For this project the game will be change from its most common size 3x3 to a 6x6 with 4 squares require to win rather than 3.</a:t>
             </a:r>
             <a:endParaRPr lang="en-US" dirty="0">
               <a:effectLst/>
@@ -5841,11 +5829,7 @@
             </a:r>
             <a:r>
               <a:rPr lang="en-US" b="1" dirty="0" smtClean="0"/>
-              <a:t>urpose</a:t>
-            </a:r>
-            <a:r>
-              <a:rPr lang="en-US" b="1" dirty="0" smtClean="0"/>
-              <a:t> of the Game</a:t>
+              <a:t>urpose of the Game</a:t>
             </a:r>
             <a:endParaRPr lang="en-US" b="1" dirty="0"/>
           </a:p>
@@ -5936,7 +5920,6 @@
               <a:rPr lang="en-US" dirty="0" smtClean="0"/>
               <a:t>Have fun playing </a:t>
             </a:r>
-            <a:endParaRPr lang="en-US" dirty="0" smtClean="0"/>
           </a:p>
         </p:txBody>
       </p:sp>
@@ -6123,13 +6106,8 @@
           <a:p>
             <a:r>
               <a:rPr lang="en-US" dirty="0" smtClean="0"/>
-              <a:t>user requirement</a:t>
-            </a:r>
-            <a:r>
-              <a:rPr lang="en-US" dirty="0" smtClean="0"/>
-              <a:t>:</a:t>
-            </a:r>
-            <a:endParaRPr lang="en-US" dirty="0" smtClean="0"/>
+              <a:t>user requirement:</a:t>
+            </a:r>
           </a:p>
           <a:p>
             <a:pPr lvl="5">
@@ -6140,7 +6118,6 @@
               <a:rPr lang="en-US" sz="2800" dirty="0" smtClean="0"/>
               <a:t>Login in as a user in order to play</a:t>
             </a:r>
-            <a:endParaRPr lang="en-US" sz="2800" dirty="0" smtClean="0"/>
           </a:p>
           <a:p>
             <a:pPr lvl="5">
@@ -6174,7 +6151,6 @@
               <a:rPr lang="en-US" sz="2800" dirty="0" smtClean="0"/>
               <a:t>Update score as users have aligned squares</a:t>
             </a:r>
-            <a:endParaRPr lang="en-US" sz="2800" dirty="0" smtClean="0"/>
           </a:p>
         </p:txBody>
       </p:sp>

</xml_diff>